<commit_message>
Projeto final closes #83
</commit_message>
<xml_diff>
--- a/2º Semestre/Arquitetura e modelagem de dados/Projeto final/Slide.pptx
+++ b/2º Semestre/Arquitetura e modelagem de dados/Projeto final/Slide.pptx
@@ -226,7 +226,7 @@
           <a:p>
             <a:fld id="{42E64E69-AB36-4ED5-9FE5-0E304ABA64BE}" type="datetimeFigureOut">
               <a:rPr lang="pt-BR" smtClean="0"/>
-              <a:t>26/11/2018</a:t>
+              <a:t>30/11/2018</a:t>
             </a:fld>
             <a:endParaRPr lang="pt-BR"/>
           </a:p>
@@ -640,7 +640,7 @@
           <a:p>
             <a:fld id="{372EE6C8-D507-47FC-B932-52EEF7233B7C}" type="datetimeFigureOut">
               <a:rPr lang="pt-BR" smtClean="0"/>
-              <a:t>26/11/2018</a:t>
+              <a:t>30/11/2018</a:t>
             </a:fld>
             <a:endParaRPr lang="pt-BR"/>
           </a:p>
@@ -838,7 +838,7 @@
           <a:p>
             <a:fld id="{372EE6C8-D507-47FC-B932-52EEF7233B7C}" type="datetimeFigureOut">
               <a:rPr lang="pt-BR" smtClean="0"/>
-              <a:t>26/11/2018</a:t>
+              <a:t>30/11/2018</a:t>
             </a:fld>
             <a:endParaRPr lang="pt-BR"/>
           </a:p>
@@ -1046,7 +1046,7 @@
           <a:p>
             <a:fld id="{372EE6C8-D507-47FC-B932-52EEF7233B7C}" type="datetimeFigureOut">
               <a:rPr lang="pt-BR" smtClean="0"/>
-              <a:t>26/11/2018</a:t>
+              <a:t>30/11/2018</a:t>
             </a:fld>
             <a:endParaRPr lang="pt-BR"/>
           </a:p>
@@ -1244,7 +1244,7 @@
           <a:p>
             <a:fld id="{372EE6C8-D507-47FC-B932-52EEF7233B7C}" type="datetimeFigureOut">
               <a:rPr lang="pt-BR" smtClean="0"/>
-              <a:t>26/11/2018</a:t>
+              <a:t>30/11/2018</a:t>
             </a:fld>
             <a:endParaRPr lang="pt-BR"/>
           </a:p>
@@ -1519,7 +1519,7 @@
           <a:p>
             <a:fld id="{372EE6C8-D507-47FC-B932-52EEF7233B7C}" type="datetimeFigureOut">
               <a:rPr lang="pt-BR" smtClean="0"/>
-              <a:t>26/11/2018</a:t>
+              <a:t>30/11/2018</a:t>
             </a:fld>
             <a:endParaRPr lang="pt-BR"/>
           </a:p>
@@ -1784,7 +1784,7 @@
           <a:p>
             <a:fld id="{372EE6C8-D507-47FC-B932-52EEF7233B7C}" type="datetimeFigureOut">
               <a:rPr lang="pt-BR" smtClean="0"/>
-              <a:t>26/11/2018</a:t>
+              <a:t>30/11/2018</a:t>
             </a:fld>
             <a:endParaRPr lang="pt-BR"/>
           </a:p>
@@ -2196,7 +2196,7 @@
           <a:p>
             <a:fld id="{372EE6C8-D507-47FC-B932-52EEF7233B7C}" type="datetimeFigureOut">
               <a:rPr lang="pt-BR" smtClean="0"/>
-              <a:t>26/11/2018</a:t>
+              <a:t>30/11/2018</a:t>
             </a:fld>
             <a:endParaRPr lang="pt-BR"/>
           </a:p>
@@ -2337,7 +2337,7 @@
           <a:p>
             <a:fld id="{372EE6C8-D507-47FC-B932-52EEF7233B7C}" type="datetimeFigureOut">
               <a:rPr lang="pt-BR" smtClean="0"/>
-              <a:t>26/11/2018</a:t>
+              <a:t>30/11/2018</a:t>
             </a:fld>
             <a:endParaRPr lang="pt-BR"/>
           </a:p>
@@ -2450,7 +2450,7 @@
           <a:p>
             <a:fld id="{372EE6C8-D507-47FC-B932-52EEF7233B7C}" type="datetimeFigureOut">
               <a:rPr lang="pt-BR" smtClean="0"/>
-              <a:t>26/11/2018</a:t>
+              <a:t>30/11/2018</a:t>
             </a:fld>
             <a:endParaRPr lang="pt-BR"/>
           </a:p>
@@ -2761,7 +2761,7 @@
           <a:p>
             <a:fld id="{372EE6C8-D507-47FC-B932-52EEF7233B7C}" type="datetimeFigureOut">
               <a:rPr lang="pt-BR" smtClean="0"/>
-              <a:t>26/11/2018</a:t>
+              <a:t>30/11/2018</a:t>
             </a:fld>
             <a:endParaRPr lang="pt-BR"/>
           </a:p>
@@ -3049,7 +3049,7 @@
           <a:p>
             <a:fld id="{372EE6C8-D507-47FC-B932-52EEF7233B7C}" type="datetimeFigureOut">
               <a:rPr lang="pt-BR" smtClean="0"/>
-              <a:t>26/11/2018</a:t>
+              <a:t>30/11/2018</a:t>
             </a:fld>
             <a:endParaRPr lang="pt-BR"/>
           </a:p>
@@ -3290,7 +3290,7 @@
           <a:p>
             <a:fld id="{372EE6C8-D507-47FC-B932-52EEF7233B7C}" type="datetimeFigureOut">
               <a:rPr lang="pt-BR" smtClean="0"/>
-              <a:t>26/11/2018</a:t>
+              <a:t>30/11/2018</a:t>
             </a:fld>
             <a:endParaRPr lang="pt-BR"/>
           </a:p>
@@ -6385,7 +6385,7 @@
               <a:rPr lang="pt-BR" sz="1600" dirty="0">
                 <a:latin typeface="Trajan Pro" panose="02020502050506020301" pitchFamily="18" charset="0"/>
               </a:rPr>
-              <a:t>BIO_RAÇA, BIO_MORTE, BIO_MORTO_POR, BIO_NASCIMENTO, BIO_GENERO, BIO_COR_CABELO, BIO_COR_PELE, BIO_COR_OLHOS, BIO_FUNCACAO)</a:t>
+              <a:t>BIO_RAÇA, BIO_MORTE, BIO_MORTO_POR, BIO_NASCIMENTO, BIO_GENERO, BIO_COR_CABELO, BIO_COR_PELE, BIO_COR_OLHOS, BIO_FUNCAO)</a:t>
             </a:r>
           </a:p>
           <a:p>
@@ -6566,7 +6566,25 @@
               <a:rPr lang="pt-BR" sz="1600" dirty="0">
                 <a:latin typeface="Trajan Pro" panose="02020502050506020301" pitchFamily="18" charset="0"/>
               </a:rPr>
-              <a:t>,  VEI_CLASSE,  VEI_FABRICANTE,  VEI_TRIPULAÇÃO,  VEI_QTD_PASSAGEIRO,  VEI_FUNCACAO)</a:t>
+              <a:t>,  VEI_CLASSE,  VEI_FABRICANTE,  VEI_TRIPULAÇÃO,  VEI_QTD_PASSAGEIRO,  VEI</a:t>
+            </a:r>
+            <a:r>
+              <a:rPr lang="pt-BR" sz="1600">
+                <a:latin typeface="Trajan Pro" panose="02020502050506020301" pitchFamily="18" charset="0"/>
+              </a:rPr>
+              <a:t>_</a:t>
+            </a:r>
+            <a:r>
+              <a:rPr lang="pt-BR" sz="1600" u="sng">
+                <a:latin typeface="Trajan Pro" panose="02020502050506020301" pitchFamily="18" charset="0"/>
+              </a:rPr>
+              <a:t>FUNCAO</a:t>
+            </a:r>
+            <a:r>
+              <a:rPr lang="pt-BR" sz="1600" dirty="0">
+                <a:latin typeface="Trajan Pro" panose="02020502050506020301" pitchFamily="18" charset="0"/>
+              </a:rPr>
+              <a:t>)</a:t>
             </a:r>
           </a:p>
           <a:p>

</xml_diff>